<commit_message>
update model and output
</commit_message>
<xml_diff>
--- a/Output/shorevsship.pptx
+++ b/Output/shorevsship.pptx
@@ -110,7 +110,7 @@
   <p:extLst>
     <p:ext uri="{EFAFB233-063F-42B5-8137-9DF3F51BA10A}">
       <p15:sldGuideLst xmlns:p15="http://schemas.microsoft.com/office/powerpoint/2012/main">
-        <p15:guide id="1" orient="horz" pos="1152" userDrawn="1">
+        <p15:guide id="1" orient="horz" pos="240" userDrawn="1">
           <p15:clr>
             <a:srgbClr val="A4A3A4"/>
           </p15:clr>
@@ -3422,10 +3422,10 @@
       </p:grpSpPr>
       <p:pic>
         <p:nvPicPr>
-          <p:cNvPr id="5" name="Picture 4">
+          <p:cNvPr id="33" name="Picture 32">
             <a:extLst>
               <a:ext uri="{FF2B5EF4-FFF2-40B4-BE49-F238E27FC236}">
-                <a16:creationId xmlns:a16="http://schemas.microsoft.com/office/drawing/2014/main" id="{497F7A97-E5B4-E742-BF30-9F8ABAE7E1D6}"/>
+                <a16:creationId xmlns:a16="http://schemas.microsoft.com/office/drawing/2014/main" id="{1A6C70B9-1E80-F14B-8DDC-A630E2B0023A}"/>
               </a:ext>
             </a:extLst>
           </p:cNvPr>
@@ -3436,13 +3436,13 @@
         </p:nvPicPr>
         <p:blipFill rotWithShape="1">
           <a:blip r:embed="rId3"/>
-          <a:srcRect t="8171" b="11089"/>
+          <a:srcRect l="6824" t="14824" b="11817"/>
           <a:stretch/>
         </p:blipFill>
         <p:spPr>
           <a:xfrm>
-            <a:off x="0" y="77490"/>
-            <a:ext cx="3983064" cy="3215898"/>
+            <a:off x="270024" y="315884"/>
+            <a:ext cx="3686985" cy="2902827"/>
           </a:xfrm>
           <a:prstGeom prst="rect">
             <a:avLst/>
@@ -3451,10 +3451,10 @@
       </p:pic>
       <p:pic>
         <p:nvPicPr>
-          <p:cNvPr id="7" name="Picture 6">
+          <p:cNvPr id="35" name="Picture 34">
             <a:extLst>
               <a:ext uri="{FF2B5EF4-FFF2-40B4-BE49-F238E27FC236}">
-                <a16:creationId xmlns:a16="http://schemas.microsoft.com/office/drawing/2014/main" id="{2A9BF95B-03F2-1343-8E4D-B19E642FFB92}"/>
+                <a16:creationId xmlns:a16="http://schemas.microsoft.com/office/drawing/2014/main" id="{C6ACEBFB-C9CD-E54F-A051-199AEA6BDE01}"/>
               </a:ext>
             </a:extLst>
           </p:cNvPr>
@@ -3465,13 +3465,13 @@
         </p:nvPicPr>
         <p:blipFill rotWithShape="1">
           <a:blip r:embed="rId4"/>
-          <a:srcRect t="8171" r="5301" b="11089"/>
+          <a:srcRect l="7909" t="15835" r="4738" b="11817"/>
           <a:stretch/>
         </p:blipFill>
         <p:spPr>
           <a:xfrm>
-            <a:off x="3771900" y="77490"/>
-            <a:ext cx="3771900" cy="3215898"/>
+            <a:off x="4087245" y="358843"/>
+            <a:ext cx="3456556" cy="2862835"/>
           </a:xfrm>
           <a:prstGeom prst="rect">
             <a:avLst/>
@@ -3492,7 +3492,7 @@
         </p:nvSpPr>
         <p:spPr>
           <a:xfrm>
-            <a:off x="650929" y="3257598"/>
+            <a:off x="650929" y="3196228"/>
             <a:ext cx="3022169" cy="415498"/>
           </a:xfrm>
           <a:prstGeom prst="rect">
@@ -3531,7 +3531,7 @@
         </p:nvSpPr>
         <p:spPr>
           <a:xfrm>
-            <a:off x="4407330" y="3257598"/>
+            <a:off x="4407330" y="3196228"/>
             <a:ext cx="3037668" cy="415498"/>
           </a:xfrm>
           <a:prstGeom prst="rect">
@@ -3608,7 +3608,7 @@
         </p:nvSpPr>
         <p:spPr>
           <a:xfrm>
-            <a:off x="3748008" y="-1"/>
+            <a:off x="3723460" y="-1"/>
             <a:ext cx="2805193" cy="276999"/>
           </a:xfrm>
           <a:prstGeom prst="rect">
@@ -3629,6 +3629,1258 @@
               </a:rPr>
               <a:t>B. on-ship mosquito detection</a:t>
             </a:r>
+          </a:p>
+        </p:txBody>
+      </p:sp>
+      <p:sp>
+        <p:nvSpPr>
+          <p:cNvPr id="12" name="TextBox 11">
+            <a:extLst>
+              <a:ext uri="{FF2B5EF4-FFF2-40B4-BE49-F238E27FC236}">
+                <a16:creationId xmlns:a16="http://schemas.microsoft.com/office/drawing/2014/main" id="{09745EED-64CE-4A4C-9259-E3896D6EA904}"/>
+              </a:ext>
+            </a:extLst>
+          </p:cNvPr>
+          <p:cNvSpPr txBox="1"/>
+          <p:nvPr/>
+        </p:nvSpPr>
+        <p:spPr>
+          <a:xfrm>
+            <a:off x="5191359" y="379109"/>
+            <a:ext cx="2253639" cy="338554"/>
+          </a:xfrm>
+          <a:prstGeom prst="rect">
+            <a:avLst/>
+          </a:prstGeom>
+          <a:noFill/>
+        </p:spPr>
+        <p:txBody>
+          <a:bodyPr wrap="square" rtlCol="0">
+            <a:spAutoFit/>
+          </a:bodyPr>
+          <a:lstStyle/>
+          <a:p>
+            <a:r>
+              <a:rPr lang="en-US" sz="800" dirty="0">
+                <a:latin typeface="Arial" panose="020B0604020202020204" pitchFamily="34" charset="0"/>
+                <a:cs typeface="Arial" panose="020B0604020202020204" pitchFamily="34" charset="0"/>
+              </a:rPr>
+              <a:t>probability of detecting mosquito populations </a:t>
+            </a:r>
+          </a:p>
+          <a:p>
+            <a:r>
+              <a:rPr lang="en-US" sz="800" dirty="0">
+                <a:latin typeface="Arial" panose="020B0604020202020204" pitchFamily="34" charset="0"/>
+                <a:cs typeface="Arial" panose="020B0604020202020204" pitchFamily="34" charset="0"/>
+              </a:rPr>
+              <a:t>on shore:</a:t>
+            </a:r>
+          </a:p>
+        </p:txBody>
+      </p:sp>
+      <p:sp>
+        <p:nvSpPr>
+          <p:cNvPr id="13" name="TextBox 12">
+            <a:extLst>
+              <a:ext uri="{FF2B5EF4-FFF2-40B4-BE49-F238E27FC236}">
+                <a16:creationId xmlns:a16="http://schemas.microsoft.com/office/drawing/2014/main" id="{1EE6ED71-1A2F-5140-8033-E42A05D9ED3A}"/>
+              </a:ext>
+            </a:extLst>
+          </p:cNvPr>
+          <p:cNvSpPr txBox="1"/>
+          <p:nvPr/>
+        </p:nvSpPr>
+        <p:spPr>
+          <a:xfrm>
+            <a:off x="6047440" y="518155"/>
+            <a:ext cx="379029" cy="215444"/>
+          </a:xfrm>
+          <a:prstGeom prst="rect">
+            <a:avLst/>
+          </a:prstGeom>
+          <a:noFill/>
+        </p:spPr>
+        <p:txBody>
+          <a:bodyPr wrap="square" rtlCol="0">
+            <a:spAutoFit/>
+          </a:bodyPr>
+          <a:lstStyle/>
+          <a:p>
+            <a:r>
+              <a:rPr lang="en-US" sz="800" dirty="0">
+                <a:latin typeface="Arial" panose="020B0604020202020204" pitchFamily="34" charset="0"/>
+                <a:cs typeface="Arial" panose="020B0604020202020204" pitchFamily="34" charset="0"/>
+              </a:rPr>
+              <a:t>0.0</a:t>
+            </a:r>
+          </a:p>
+        </p:txBody>
+      </p:sp>
+      <p:sp>
+        <p:nvSpPr>
+          <p:cNvPr id="14" name="TextBox 13">
+            <a:extLst>
+              <a:ext uri="{FF2B5EF4-FFF2-40B4-BE49-F238E27FC236}">
+                <a16:creationId xmlns:a16="http://schemas.microsoft.com/office/drawing/2014/main" id="{D770BE15-C879-7A49-8940-46CD831A430D}"/>
+              </a:ext>
+            </a:extLst>
+          </p:cNvPr>
+          <p:cNvSpPr txBox="1"/>
+          <p:nvPr/>
+        </p:nvSpPr>
+        <p:spPr>
+          <a:xfrm>
+            <a:off x="6047440" y="670555"/>
+            <a:ext cx="379029" cy="215444"/>
+          </a:xfrm>
+          <a:prstGeom prst="rect">
+            <a:avLst/>
+          </a:prstGeom>
+          <a:noFill/>
+        </p:spPr>
+        <p:txBody>
+          <a:bodyPr wrap="square" rtlCol="0">
+            <a:spAutoFit/>
+          </a:bodyPr>
+          <a:lstStyle/>
+          <a:p>
+            <a:r>
+              <a:rPr lang="en-US" sz="800" dirty="0">
+                <a:latin typeface="Arial" panose="020B0604020202020204" pitchFamily="34" charset="0"/>
+                <a:cs typeface="Arial" panose="020B0604020202020204" pitchFamily="34" charset="0"/>
+              </a:rPr>
+              <a:t>0.2</a:t>
+            </a:r>
+          </a:p>
+        </p:txBody>
+      </p:sp>
+      <p:sp>
+        <p:nvSpPr>
+          <p:cNvPr id="15" name="TextBox 14">
+            <a:extLst>
+              <a:ext uri="{FF2B5EF4-FFF2-40B4-BE49-F238E27FC236}">
+                <a16:creationId xmlns:a16="http://schemas.microsoft.com/office/drawing/2014/main" id="{0FBE6DC7-CD60-0F4B-83FF-BA60E67ABD94}"/>
+              </a:ext>
+            </a:extLst>
+          </p:cNvPr>
+          <p:cNvSpPr txBox="1"/>
+          <p:nvPr/>
+        </p:nvSpPr>
+        <p:spPr>
+          <a:xfrm>
+            <a:off x="6556704" y="518155"/>
+            <a:ext cx="379029" cy="215444"/>
+          </a:xfrm>
+          <a:prstGeom prst="rect">
+            <a:avLst/>
+          </a:prstGeom>
+          <a:noFill/>
+        </p:spPr>
+        <p:txBody>
+          <a:bodyPr wrap="square" rtlCol="0">
+            <a:spAutoFit/>
+          </a:bodyPr>
+          <a:lstStyle/>
+          <a:p>
+            <a:r>
+              <a:rPr lang="en-US" sz="800" dirty="0">
+                <a:latin typeface="Arial" panose="020B0604020202020204" pitchFamily="34" charset="0"/>
+                <a:cs typeface="Arial" panose="020B0604020202020204" pitchFamily="34" charset="0"/>
+              </a:rPr>
+              <a:t>0.4</a:t>
+            </a:r>
+          </a:p>
+        </p:txBody>
+      </p:sp>
+      <p:sp>
+        <p:nvSpPr>
+          <p:cNvPr id="16" name="TextBox 15">
+            <a:extLst>
+              <a:ext uri="{FF2B5EF4-FFF2-40B4-BE49-F238E27FC236}">
+                <a16:creationId xmlns:a16="http://schemas.microsoft.com/office/drawing/2014/main" id="{8CF7981B-D5B0-E140-8164-3B5F0FD59F13}"/>
+              </a:ext>
+            </a:extLst>
+          </p:cNvPr>
+          <p:cNvSpPr txBox="1"/>
+          <p:nvPr/>
+        </p:nvSpPr>
+        <p:spPr>
+          <a:xfrm>
+            <a:off x="6556704" y="670555"/>
+            <a:ext cx="379029" cy="215444"/>
+          </a:xfrm>
+          <a:prstGeom prst="rect">
+            <a:avLst/>
+          </a:prstGeom>
+          <a:noFill/>
+        </p:spPr>
+        <p:txBody>
+          <a:bodyPr wrap="square" rtlCol="0">
+            <a:spAutoFit/>
+          </a:bodyPr>
+          <a:lstStyle/>
+          <a:p>
+            <a:r>
+              <a:rPr lang="en-US" sz="800" dirty="0">
+                <a:latin typeface="Arial" panose="020B0604020202020204" pitchFamily="34" charset="0"/>
+                <a:cs typeface="Arial" panose="020B0604020202020204" pitchFamily="34" charset="0"/>
+              </a:rPr>
+              <a:t>0.6</a:t>
+            </a:r>
+          </a:p>
+        </p:txBody>
+      </p:sp>
+      <p:sp>
+        <p:nvSpPr>
+          <p:cNvPr id="17" name="TextBox 16">
+            <a:extLst>
+              <a:ext uri="{FF2B5EF4-FFF2-40B4-BE49-F238E27FC236}">
+                <a16:creationId xmlns:a16="http://schemas.microsoft.com/office/drawing/2014/main" id="{0EC7A6B5-5DFC-6740-A839-F77AD69BF63B}"/>
+              </a:ext>
+            </a:extLst>
+          </p:cNvPr>
+          <p:cNvSpPr txBox="1"/>
+          <p:nvPr/>
+        </p:nvSpPr>
+        <p:spPr>
+          <a:xfrm>
+            <a:off x="7065969" y="518155"/>
+            <a:ext cx="379029" cy="215444"/>
+          </a:xfrm>
+          <a:prstGeom prst="rect">
+            <a:avLst/>
+          </a:prstGeom>
+          <a:noFill/>
+        </p:spPr>
+        <p:txBody>
+          <a:bodyPr wrap="square" rtlCol="0">
+            <a:spAutoFit/>
+          </a:bodyPr>
+          <a:lstStyle/>
+          <a:p>
+            <a:r>
+              <a:rPr lang="en-US" sz="800" dirty="0">
+                <a:latin typeface="Arial" panose="020B0604020202020204" pitchFamily="34" charset="0"/>
+                <a:cs typeface="Arial" panose="020B0604020202020204" pitchFamily="34" charset="0"/>
+              </a:rPr>
+              <a:t>0.8</a:t>
+            </a:r>
+          </a:p>
+        </p:txBody>
+      </p:sp>
+      <p:sp>
+        <p:nvSpPr>
+          <p:cNvPr id="18" name="TextBox 17">
+            <a:extLst>
+              <a:ext uri="{FF2B5EF4-FFF2-40B4-BE49-F238E27FC236}">
+                <a16:creationId xmlns:a16="http://schemas.microsoft.com/office/drawing/2014/main" id="{416D6AB7-971F-9F44-93D2-6397FE9941F5}"/>
+              </a:ext>
+            </a:extLst>
+          </p:cNvPr>
+          <p:cNvSpPr txBox="1"/>
+          <p:nvPr/>
+        </p:nvSpPr>
+        <p:spPr>
+          <a:xfrm>
+            <a:off x="7065969" y="670555"/>
+            <a:ext cx="379029" cy="215444"/>
+          </a:xfrm>
+          <a:prstGeom prst="rect">
+            <a:avLst/>
+          </a:prstGeom>
+          <a:noFill/>
+        </p:spPr>
+        <p:txBody>
+          <a:bodyPr wrap="square" rtlCol="0">
+            <a:spAutoFit/>
+          </a:bodyPr>
+          <a:lstStyle/>
+          <a:p>
+            <a:r>
+              <a:rPr lang="en-US" sz="800" dirty="0">
+                <a:latin typeface="Arial" panose="020B0604020202020204" pitchFamily="34" charset="0"/>
+                <a:cs typeface="Arial" panose="020B0604020202020204" pitchFamily="34" charset="0"/>
+              </a:rPr>
+              <a:t>1.0</a:t>
+            </a:r>
+          </a:p>
+        </p:txBody>
+      </p:sp>
+      <p:sp>
+        <p:nvSpPr>
+          <p:cNvPr id="19" name="TextBox 18">
+            <a:extLst>
+              <a:ext uri="{FF2B5EF4-FFF2-40B4-BE49-F238E27FC236}">
+                <a16:creationId xmlns:a16="http://schemas.microsoft.com/office/drawing/2014/main" id="{A4D1017E-3459-F848-8E34-6F2D8E498B16}"/>
+              </a:ext>
+            </a:extLst>
+          </p:cNvPr>
+          <p:cNvSpPr txBox="1"/>
+          <p:nvPr/>
+        </p:nvSpPr>
+        <p:spPr>
+          <a:xfrm>
+            <a:off x="1419459" y="379109"/>
+            <a:ext cx="2253639" cy="338554"/>
+          </a:xfrm>
+          <a:prstGeom prst="rect">
+            <a:avLst/>
+          </a:prstGeom>
+          <a:noFill/>
+        </p:spPr>
+        <p:txBody>
+          <a:bodyPr wrap="square" rtlCol="0">
+            <a:spAutoFit/>
+          </a:bodyPr>
+          <a:lstStyle/>
+          <a:p>
+            <a:r>
+              <a:rPr lang="en-US" sz="800" dirty="0">
+                <a:latin typeface="Arial" panose="020B0604020202020204" pitchFamily="34" charset="0"/>
+                <a:cs typeface="Arial" panose="020B0604020202020204" pitchFamily="34" charset="0"/>
+              </a:rPr>
+              <a:t>probability of detecting mosquito populations </a:t>
+            </a:r>
+          </a:p>
+          <a:p>
+            <a:r>
+              <a:rPr lang="en-US" sz="800" dirty="0">
+                <a:latin typeface="Arial" panose="020B0604020202020204" pitchFamily="34" charset="0"/>
+                <a:cs typeface="Arial" panose="020B0604020202020204" pitchFamily="34" charset="0"/>
+              </a:rPr>
+              <a:t>on ship:</a:t>
+            </a:r>
+          </a:p>
+        </p:txBody>
+      </p:sp>
+      <p:sp>
+        <p:nvSpPr>
+          <p:cNvPr id="20" name="TextBox 19">
+            <a:extLst>
+              <a:ext uri="{FF2B5EF4-FFF2-40B4-BE49-F238E27FC236}">
+                <a16:creationId xmlns:a16="http://schemas.microsoft.com/office/drawing/2014/main" id="{445CF484-848C-AF45-8762-1568A80D008D}"/>
+              </a:ext>
+            </a:extLst>
+          </p:cNvPr>
+          <p:cNvSpPr txBox="1"/>
+          <p:nvPr/>
+        </p:nvSpPr>
+        <p:spPr>
+          <a:xfrm>
+            <a:off x="2275540" y="518155"/>
+            <a:ext cx="379029" cy="215444"/>
+          </a:xfrm>
+          <a:prstGeom prst="rect">
+            <a:avLst/>
+          </a:prstGeom>
+          <a:noFill/>
+        </p:spPr>
+        <p:txBody>
+          <a:bodyPr wrap="square" rtlCol="0">
+            <a:spAutoFit/>
+          </a:bodyPr>
+          <a:lstStyle/>
+          <a:p>
+            <a:r>
+              <a:rPr lang="en-US" sz="800" dirty="0">
+                <a:latin typeface="Arial" panose="020B0604020202020204" pitchFamily="34" charset="0"/>
+                <a:cs typeface="Arial" panose="020B0604020202020204" pitchFamily="34" charset="0"/>
+              </a:rPr>
+              <a:t>0.0</a:t>
+            </a:r>
+          </a:p>
+        </p:txBody>
+      </p:sp>
+      <p:sp>
+        <p:nvSpPr>
+          <p:cNvPr id="21" name="TextBox 20">
+            <a:extLst>
+              <a:ext uri="{FF2B5EF4-FFF2-40B4-BE49-F238E27FC236}">
+                <a16:creationId xmlns:a16="http://schemas.microsoft.com/office/drawing/2014/main" id="{0E7B5B67-76C0-294B-8D3A-01B8D3861632}"/>
+              </a:ext>
+            </a:extLst>
+          </p:cNvPr>
+          <p:cNvSpPr txBox="1"/>
+          <p:nvPr/>
+        </p:nvSpPr>
+        <p:spPr>
+          <a:xfrm>
+            <a:off x="2275540" y="670555"/>
+            <a:ext cx="379029" cy="215444"/>
+          </a:xfrm>
+          <a:prstGeom prst="rect">
+            <a:avLst/>
+          </a:prstGeom>
+          <a:noFill/>
+        </p:spPr>
+        <p:txBody>
+          <a:bodyPr wrap="square" rtlCol="0">
+            <a:spAutoFit/>
+          </a:bodyPr>
+          <a:lstStyle/>
+          <a:p>
+            <a:r>
+              <a:rPr lang="en-US" sz="800" dirty="0">
+                <a:latin typeface="Arial" panose="020B0604020202020204" pitchFamily="34" charset="0"/>
+                <a:cs typeface="Arial" panose="020B0604020202020204" pitchFamily="34" charset="0"/>
+              </a:rPr>
+              <a:t>0.2</a:t>
+            </a:r>
+          </a:p>
+        </p:txBody>
+      </p:sp>
+      <p:sp>
+        <p:nvSpPr>
+          <p:cNvPr id="22" name="TextBox 21">
+            <a:extLst>
+              <a:ext uri="{FF2B5EF4-FFF2-40B4-BE49-F238E27FC236}">
+                <a16:creationId xmlns:a16="http://schemas.microsoft.com/office/drawing/2014/main" id="{FB497CDA-76EC-704B-B3F4-83A132536F11}"/>
+              </a:ext>
+            </a:extLst>
+          </p:cNvPr>
+          <p:cNvSpPr txBox="1"/>
+          <p:nvPr/>
+        </p:nvSpPr>
+        <p:spPr>
+          <a:xfrm>
+            <a:off x="2784804" y="518155"/>
+            <a:ext cx="379029" cy="215444"/>
+          </a:xfrm>
+          <a:prstGeom prst="rect">
+            <a:avLst/>
+          </a:prstGeom>
+          <a:noFill/>
+        </p:spPr>
+        <p:txBody>
+          <a:bodyPr wrap="square" rtlCol="0">
+            <a:spAutoFit/>
+          </a:bodyPr>
+          <a:lstStyle/>
+          <a:p>
+            <a:r>
+              <a:rPr lang="en-US" sz="800" dirty="0">
+                <a:latin typeface="Arial" panose="020B0604020202020204" pitchFamily="34" charset="0"/>
+                <a:cs typeface="Arial" panose="020B0604020202020204" pitchFamily="34" charset="0"/>
+              </a:rPr>
+              <a:t>0.4</a:t>
+            </a:r>
+          </a:p>
+        </p:txBody>
+      </p:sp>
+      <p:sp>
+        <p:nvSpPr>
+          <p:cNvPr id="23" name="TextBox 22">
+            <a:extLst>
+              <a:ext uri="{FF2B5EF4-FFF2-40B4-BE49-F238E27FC236}">
+                <a16:creationId xmlns:a16="http://schemas.microsoft.com/office/drawing/2014/main" id="{F358A4A6-44A5-1F43-B756-82B115F8A1B9}"/>
+              </a:ext>
+            </a:extLst>
+          </p:cNvPr>
+          <p:cNvSpPr txBox="1"/>
+          <p:nvPr/>
+        </p:nvSpPr>
+        <p:spPr>
+          <a:xfrm>
+            <a:off x="2784804" y="670555"/>
+            <a:ext cx="379029" cy="215444"/>
+          </a:xfrm>
+          <a:prstGeom prst="rect">
+            <a:avLst/>
+          </a:prstGeom>
+          <a:noFill/>
+        </p:spPr>
+        <p:txBody>
+          <a:bodyPr wrap="square" rtlCol="0">
+            <a:spAutoFit/>
+          </a:bodyPr>
+          <a:lstStyle/>
+          <a:p>
+            <a:r>
+              <a:rPr lang="en-US" sz="800" dirty="0">
+                <a:latin typeface="Arial" panose="020B0604020202020204" pitchFamily="34" charset="0"/>
+                <a:cs typeface="Arial" panose="020B0604020202020204" pitchFamily="34" charset="0"/>
+              </a:rPr>
+              <a:t>0.6</a:t>
+            </a:r>
+          </a:p>
+        </p:txBody>
+      </p:sp>
+      <p:sp>
+        <p:nvSpPr>
+          <p:cNvPr id="24" name="TextBox 23">
+            <a:extLst>
+              <a:ext uri="{FF2B5EF4-FFF2-40B4-BE49-F238E27FC236}">
+                <a16:creationId xmlns:a16="http://schemas.microsoft.com/office/drawing/2014/main" id="{3F049E69-7E5D-4644-BB75-95EAA7C5458C}"/>
+              </a:ext>
+            </a:extLst>
+          </p:cNvPr>
+          <p:cNvSpPr txBox="1"/>
+          <p:nvPr/>
+        </p:nvSpPr>
+        <p:spPr>
+          <a:xfrm>
+            <a:off x="3294069" y="518155"/>
+            <a:ext cx="379029" cy="215444"/>
+          </a:xfrm>
+          <a:prstGeom prst="rect">
+            <a:avLst/>
+          </a:prstGeom>
+          <a:noFill/>
+        </p:spPr>
+        <p:txBody>
+          <a:bodyPr wrap="square" rtlCol="0">
+            <a:spAutoFit/>
+          </a:bodyPr>
+          <a:lstStyle/>
+          <a:p>
+            <a:r>
+              <a:rPr lang="en-US" sz="800" dirty="0">
+                <a:latin typeface="Arial" panose="020B0604020202020204" pitchFamily="34" charset="0"/>
+                <a:cs typeface="Arial" panose="020B0604020202020204" pitchFamily="34" charset="0"/>
+              </a:rPr>
+              <a:t>0.8</a:t>
+            </a:r>
+          </a:p>
+        </p:txBody>
+      </p:sp>
+      <p:sp>
+        <p:nvSpPr>
+          <p:cNvPr id="25" name="TextBox 24">
+            <a:extLst>
+              <a:ext uri="{FF2B5EF4-FFF2-40B4-BE49-F238E27FC236}">
+                <a16:creationId xmlns:a16="http://schemas.microsoft.com/office/drawing/2014/main" id="{CFC772E1-6EAE-6046-88AE-7ECEA0AADD3C}"/>
+              </a:ext>
+            </a:extLst>
+          </p:cNvPr>
+          <p:cNvSpPr txBox="1"/>
+          <p:nvPr/>
+        </p:nvSpPr>
+        <p:spPr>
+          <a:xfrm>
+            <a:off x="3294069" y="670555"/>
+            <a:ext cx="379029" cy="215444"/>
+          </a:xfrm>
+          <a:prstGeom prst="rect">
+            <a:avLst/>
+          </a:prstGeom>
+          <a:noFill/>
+        </p:spPr>
+        <p:txBody>
+          <a:bodyPr wrap="square" rtlCol="0">
+            <a:spAutoFit/>
+          </a:bodyPr>
+          <a:lstStyle/>
+          <a:p>
+            <a:r>
+              <a:rPr lang="en-US" sz="800" dirty="0">
+                <a:latin typeface="Arial" panose="020B0604020202020204" pitchFamily="34" charset="0"/>
+                <a:cs typeface="Arial" panose="020B0604020202020204" pitchFamily="34" charset="0"/>
+              </a:rPr>
+              <a:t>1.0</a:t>
+            </a:r>
+          </a:p>
+        </p:txBody>
+      </p:sp>
+      <p:sp>
+        <p:nvSpPr>
+          <p:cNvPr id="2" name="Oval 1">
+            <a:extLst>
+              <a:ext uri="{FF2B5EF4-FFF2-40B4-BE49-F238E27FC236}">
+                <a16:creationId xmlns:a16="http://schemas.microsoft.com/office/drawing/2014/main" id="{6AE8B724-ABEC-524F-995C-FFEDE3EE6FE2}"/>
+              </a:ext>
+            </a:extLst>
+          </p:cNvPr>
+          <p:cNvSpPr/>
+          <p:nvPr/>
+        </p:nvSpPr>
+        <p:spPr>
+          <a:xfrm>
+            <a:off x="2176738" y="575552"/>
+            <a:ext cx="91440" cy="95003"/>
+          </a:xfrm>
+          <a:prstGeom prst="ellipse">
+            <a:avLst/>
+          </a:prstGeom>
+          <a:solidFill>
+            <a:srgbClr val="D2F2A3"/>
+          </a:solidFill>
+          <a:ln>
+            <a:noFill/>
+          </a:ln>
+        </p:spPr>
+        <p:style>
+          <a:lnRef idx="2">
+            <a:schemeClr val="accent1">
+              <a:shade val="50000"/>
+            </a:schemeClr>
+          </a:lnRef>
+          <a:fillRef idx="1">
+            <a:schemeClr val="accent1"/>
+          </a:fillRef>
+          <a:effectRef idx="0">
+            <a:schemeClr val="accent1"/>
+          </a:effectRef>
+          <a:fontRef idx="minor">
+            <a:schemeClr val="lt1"/>
+          </a:fontRef>
+        </p:style>
+        <p:txBody>
+          <a:bodyPr rtlCol="0" anchor="ctr"/>
+          <a:lstStyle/>
+          <a:p>
+            <a:pPr algn="ctr"/>
+            <a:endParaRPr lang="en-US"/>
+          </a:p>
+        </p:txBody>
+      </p:sp>
+      <p:sp>
+        <p:nvSpPr>
+          <p:cNvPr id="26" name="Oval 25">
+            <a:extLst>
+              <a:ext uri="{FF2B5EF4-FFF2-40B4-BE49-F238E27FC236}">
+                <a16:creationId xmlns:a16="http://schemas.microsoft.com/office/drawing/2014/main" id="{3A000C04-6B16-B240-ACD1-E088FAACC4B8}"/>
+              </a:ext>
+            </a:extLst>
+          </p:cNvPr>
+          <p:cNvSpPr/>
+          <p:nvPr/>
+        </p:nvSpPr>
+        <p:spPr>
+          <a:xfrm>
+            <a:off x="2715692" y="575552"/>
+            <a:ext cx="91440" cy="95003"/>
+          </a:xfrm>
+          <a:prstGeom prst="ellipse">
+            <a:avLst/>
+          </a:prstGeom>
+          <a:solidFill>
+            <a:srgbClr val="6CC08C"/>
+          </a:solidFill>
+          <a:ln>
+            <a:noFill/>
+          </a:ln>
+        </p:spPr>
+        <p:style>
+          <a:lnRef idx="2">
+            <a:schemeClr val="accent1">
+              <a:shade val="50000"/>
+            </a:schemeClr>
+          </a:lnRef>
+          <a:fillRef idx="1">
+            <a:schemeClr val="accent1"/>
+          </a:fillRef>
+          <a:effectRef idx="0">
+            <a:schemeClr val="accent1"/>
+          </a:effectRef>
+          <a:fontRef idx="minor">
+            <a:schemeClr val="lt1"/>
+          </a:fontRef>
+        </p:style>
+        <p:txBody>
+          <a:bodyPr rtlCol="0" anchor="ctr"/>
+          <a:lstStyle/>
+          <a:p>
+            <a:pPr algn="ctr"/>
+            <a:endParaRPr lang="en-US"/>
+          </a:p>
+        </p:txBody>
+      </p:sp>
+      <p:sp>
+        <p:nvSpPr>
+          <p:cNvPr id="27" name="Oval 26">
+            <a:extLst>
+              <a:ext uri="{FF2B5EF4-FFF2-40B4-BE49-F238E27FC236}">
+                <a16:creationId xmlns:a16="http://schemas.microsoft.com/office/drawing/2014/main" id="{009B2D2D-A77B-7B45-8C1E-5A3EAB0744D9}"/>
+              </a:ext>
+            </a:extLst>
+          </p:cNvPr>
+          <p:cNvSpPr/>
+          <p:nvPr/>
+        </p:nvSpPr>
+        <p:spPr>
+          <a:xfrm>
+            <a:off x="3254646" y="575552"/>
+            <a:ext cx="91440" cy="95003"/>
+          </a:xfrm>
+          <a:prstGeom prst="ellipse">
+            <a:avLst/>
+          </a:prstGeom>
+          <a:solidFill>
+            <a:srgbClr val="207A78"/>
+          </a:solidFill>
+          <a:ln>
+            <a:noFill/>
+          </a:ln>
+        </p:spPr>
+        <p:style>
+          <a:lnRef idx="2">
+            <a:schemeClr val="accent1">
+              <a:shade val="50000"/>
+            </a:schemeClr>
+          </a:lnRef>
+          <a:fillRef idx="1">
+            <a:schemeClr val="accent1"/>
+          </a:fillRef>
+          <a:effectRef idx="0">
+            <a:schemeClr val="accent1"/>
+          </a:effectRef>
+          <a:fontRef idx="minor">
+            <a:schemeClr val="lt1"/>
+          </a:fontRef>
+        </p:style>
+        <p:txBody>
+          <a:bodyPr rtlCol="0" anchor="ctr"/>
+          <a:lstStyle/>
+          <a:p>
+            <a:pPr algn="ctr"/>
+            <a:endParaRPr lang="en-US"/>
+          </a:p>
+        </p:txBody>
+      </p:sp>
+      <p:sp>
+        <p:nvSpPr>
+          <p:cNvPr id="28" name="Oval 27">
+            <a:extLst>
+              <a:ext uri="{FF2B5EF4-FFF2-40B4-BE49-F238E27FC236}">
+                <a16:creationId xmlns:a16="http://schemas.microsoft.com/office/drawing/2014/main" id="{66717A1A-4FB1-5B43-B960-DB4523338559}"/>
+              </a:ext>
+            </a:extLst>
+          </p:cNvPr>
+          <p:cNvSpPr/>
+          <p:nvPr/>
+        </p:nvSpPr>
+        <p:spPr>
+          <a:xfrm>
+            <a:off x="2179865" y="730775"/>
+            <a:ext cx="91440" cy="95003"/>
+          </a:xfrm>
+          <a:prstGeom prst="ellipse">
+            <a:avLst/>
+          </a:prstGeom>
+          <a:solidFill>
+            <a:srgbClr val="98E196"/>
+          </a:solidFill>
+          <a:ln>
+            <a:noFill/>
+          </a:ln>
+        </p:spPr>
+        <p:style>
+          <a:lnRef idx="2">
+            <a:schemeClr val="accent1">
+              <a:shade val="50000"/>
+            </a:schemeClr>
+          </a:lnRef>
+          <a:fillRef idx="1">
+            <a:schemeClr val="accent1"/>
+          </a:fillRef>
+          <a:effectRef idx="0">
+            <a:schemeClr val="accent1"/>
+          </a:effectRef>
+          <a:fontRef idx="minor">
+            <a:schemeClr val="lt1"/>
+          </a:fontRef>
+        </p:style>
+        <p:txBody>
+          <a:bodyPr rtlCol="0" anchor="ctr"/>
+          <a:lstStyle/>
+          <a:p>
+            <a:pPr algn="ctr"/>
+            <a:endParaRPr lang="en-US"/>
+          </a:p>
+        </p:txBody>
+      </p:sp>
+      <p:sp>
+        <p:nvSpPr>
+          <p:cNvPr id="29" name="Oval 28">
+            <a:extLst>
+              <a:ext uri="{FF2B5EF4-FFF2-40B4-BE49-F238E27FC236}">
+                <a16:creationId xmlns:a16="http://schemas.microsoft.com/office/drawing/2014/main" id="{4BB17B90-B53D-6B41-896A-560F2439D456}"/>
+              </a:ext>
+            </a:extLst>
+          </p:cNvPr>
+          <p:cNvSpPr/>
+          <p:nvPr/>
+        </p:nvSpPr>
+        <p:spPr>
+          <a:xfrm>
+            <a:off x="2717256" y="730775"/>
+            <a:ext cx="91440" cy="95003"/>
+          </a:xfrm>
+          <a:prstGeom prst="ellipse">
+            <a:avLst/>
+          </a:prstGeom>
+          <a:solidFill>
+            <a:srgbClr val="4A9B82"/>
+          </a:solidFill>
+          <a:ln>
+            <a:noFill/>
+          </a:ln>
+        </p:spPr>
+        <p:style>
+          <a:lnRef idx="2">
+            <a:schemeClr val="accent1">
+              <a:shade val="50000"/>
+            </a:schemeClr>
+          </a:lnRef>
+          <a:fillRef idx="1">
+            <a:schemeClr val="accent1"/>
+          </a:fillRef>
+          <a:effectRef idx="0">
+            <a:schemeClr val="accent1"/>
+          </a:effectRef>
+          <a:fontRef idx="minor">
+            <a:schemeClr val="lt1"/>
+          </a:fontRef>
+        </p:style>
+        <p:txBody>
+          <a:bodyPr rtlCol="0" anchor="ctr"/>
+          <a:lstStyle/>
+          <a:p>
+            <a:pPr algn="ctr"/>
+            <a:endParaRPr lang="en-US"/>
+          </a:p>
+        </p:txBody>
+      </p:sp>
+      <p:sp>
+        <p:nvSpPr>
+          <p:cNvPr id="30" name="Oval 29">
+            <a:extLst>
+              <a:ext uri="{FF2B5EF4-FFF2-40B4-BE49-F238E27FC236}">
+                <a16:creationId xmlns:a16="http://schemas.microsoft.com/office/drawing/2014/main" id="{7711F84F-E4A5-B649-B54A-C1AE9012D2CC}"/>
+              </a:ext>
+            </a:extLst>
+          </p:cNvPr>
+          <p:cNvSpPr/>
+          <p:nvPr/>
+        </p:nvSpPr>
+        <p:spPr>
+          <a:xfrm>
+            <a:off x="3254646" y="730775"/>
+            <a:ext cx="91440" cy="95003"/>
+          </a:xfrm>
+          <a:prstGeom prst="ellipse">
+            <a:avLst/>
+          </a:prstGeom>
+          <a:solidFill>
+            <a:srgbClr val="06404F"/>
+          </a:solidFill>
+          <a:ln>
+            <a:noFill/>
+          </a:ln>
+        </p:spPr>
+        <p:style>
+          <a:lnRef idx="2">
+            <a:schemeClr val="accent1">
+              <a:shade val="50000"/>
+            </a:schemeClr>
+          </a:lnRef>
+          <a:fillRef idx="1">
+            <a:schemeClr val="accent1"/>
+          </a:fillRef>
+          <a:effectRef idx="0">
+            <a:schemeClr val="accent1"/>
+          </a:effectRef>
+          <a:fontRef idx="minor">
+            <a:schemeClr val="lt1"/>
+          </a:fontRef>
+        </p:style>
+        <p:txBody>
+          <a:bodyPr rtlCol="0" anchor="ctr"/>
+          <a:lstStyle/>
+          <a:p>
+            <a:pPr algn="ctr"/>
+            <a:endParaRPr lang="en-US"/>
+          </a:p>
+        </p:txBody>
+      </p:sp>
+      <p:sp>
+        <p:nvSpPr>
+          <p:cNvPr id="36" name="TextBox 35">
+            <a:extLst>
+              <a:ext uri="{FF2B5EF4-FFF2-40B4-BE49-F238E27FC236}">
+                <a16:creationId xmlns:a16="http://schemas.microsoft.com/office/drawing/2014/main" id="{33C3054C-CF0E-AC4D-B422-2E04A8C23CC9}"/>
+              </a:ext>
+            </a:extLst>
+          </p:cNvPr>
+          <p:cNvSpPr txBox="1"/>
+          <p:nvPr/>
+        </p:nvSpPr>
+        <p:spPr>
+          <a:xfrm rot="16200000">
+            <a:off x="2643583" y="1495566"/>
+            <a:ext cx="2486832" cy="253916"/>
+          </a:xfrm>
+          <a:prstGeom prst="rect">
+            <a:avLst/>
+          </a:prstGeom>
+          <a:noFill/>
+        </p:spPr>
+        <p:txBody>
+          <a:bodyPr wrap="square" rtlCol="0">
+            <a:spAutoFit/>
+          </a:bodyPr>
+          <a:lstStyle/>
+          <a:p>
+            <a:pPr algn="ctr"/>
+            <a:r>
+              <a:rPr lang="en-US" sz="1050" dirty="0">
+                <a:latin typeface="Arial" panose="020B0604020202020204" pitchFamily="34" charset="0"/>
+                <a:cs typeface="Arial" panose="020B0604020202020204" pitchFamily="34" charset="0"/>
+              </a:rPr>
+              <a:t>proportion of populations established</a:t>
+            </a:r>
+          </a:p>
+        </p:txBody>
+      </p:sp>
+      <p:sp>
+        <p:nvSpPr>
+          <p:cNvPr id="37" name="TextBox 36">
+            <a:extLst>
+              <a:ext uri="{FF2B5EF4-FFF2-40B4-BE49-F238E27FC236}">
+                <a16:creationId xmlns:a16="http://schemas.microsoft.com/office/drawing/2014/main" id="{9011A98F-6B8D-014F-A5AB-5570FB18781F}"/>
+              </a:ext>
+            </a:extLst>
+          </p:cNvPr>
+          <p:cNvSpPr txBox="1"/>
+          <p:nvPr/>
+        </p:nvSpPr>
+        <p:spPr>
+          <a:xfrm rot="16200000">
+            <a:off x="-1072195" y="1495566"/>
+            <a:ext cx="2486832" cy="253916"/>
+          </a:xfrm>
+          <a:prstGeom prst="rect">
+            <a:avLst/>
+          </a:prstGeom>
+          <a:noFill/>
+        </p:spPr>
+        <p:txBody>
+          <a:bodyPr wrap="square" rtlCol="0">
+            <a:spAutoFit/>
+          </a:bodyPr>
+          <a:lstStyle/>
+          <a:p>
+            <a:pPr algn="ctr"/>
+            <a:r>
+              <a:rPr lang="en-US" sz="1050" dirty="0">
+                <a:latin typeface="Arial" panose="020B0604020202020204" pitchFamily="34" charset="0"/>
+                <a:cs typeface="Arial" panose="020B0604020202020204" pitchFamily="34" charset="0"/>
+              </a:rPr>
+              <a:t>proportion of populations established</a:t>
+            </a:r>
+          </a:p>
+        </p:txBody>
+      </p:sp>
+      <p:sp>
+        <p:nvSpPr>
+          <p:cNvPr id="38" name="Oval 37">
+            <a:extLst>
+              <a:ext uri="{FF2B5EF4-FFF2-40B4-BE49-F238E27FC236}">
+                <a16:creationId xmlns:a16="http://schemas.microsoft.com/office/drawing/2014/main" id="{98C12735-6BEC-374A-994E-A6B365E8937D}"/>
+              </a:ext>
+            </a:extLst>
+          </p:cNvPr>
+          <p:cNvSpPr/>
+          <p:nvPr/>
+        </p:nvSpPr>
+        <p:spPr>
+          <a:xfrm>
+            <a:off x="5936040" y="575552"/>
+            <a:ext cx="91440" cy="95003"/>
+          </a:xfrm>
+          <a:prstGeom prst="ellipse">
+            <a:avLst/>
+          </a:prstGeom>
+          <a:solidFill>
+            <a:srgbClr val="D2F2A3"/>
+          </a:solidFill>
+          <a:ln>
+            <a:noFill/>
+          </a:ln>
+        </p:spPr>
+        <p:style>
+          <a:lnRef idx="2">
+            <a:schemeClr val="accent1">
+              <a:shade val="50000"/>
+            </a:schemeClr>
+          </a:lnRef>
+          <a:fillRef idx="1">
+            <a:schemeClr val="accent1"/>
+          </a:fillRef>
+          <a:effectRef idx="0">
+            <a:schemeClr val="accent1"/>
+          </a:effectRef>
+          <a:fontRef idx="minor">
+            <a:schemeClr val="lt1"/>
+          </a:fontRef>
+        </p:style>
+        <p:txBody>
+          <a:bodyPr rtlCol="0" anchor="ctr"/>
+          <a:lstStyle/>
+          <a:p>
+            <a:pPr algn="ctr"/>
+            <a:endParaRPr lang="en-US"/>
+          </a:p>
+        </p:txBody>
+      </p:sp>
+      <p:sp>
+        <p:nvSpPr>
+          <p:cNvPr id="39" name="Oval 38">
+            <a:extLst>
+              <a:ext uri="{FF2B5EF4-FFF2-40B4-BE49-F238E27FC236}">
+                <a16:creationId xmlns:a16="http://schemas.microsoft.com/office/drawing/2014/main" id="{B4E50134-B4C4-6D45-BDB2-E329F0C08146}"/>
+              </a:ext>
+            </a:extLst>
+          </p:cNvPr>
+          <p:cNvSpPr/>
+          <p:nvPr/>
+        </p:nvSpPr>
+        <p:spPr>
+          <a:xfrm>
+            <a:off x="6474994" y="575552"/>
+            <a:ext cx="91440" cy="95003"/>
+          </a:xfrm>
+          <a:prstGeom prst="ellipse">
+            <a:avLst/>
+          </a:prstGeom>
+          <a:solidFill>
+            <a:srgbClr val="6CC08C"/>
+          </a:solidFill>
+          <a:ln>
+            <a:noFill/>
+          </a:ln>
+        </p:spPr>
+        <p:style>
+          <a:lnRef idx="2">
+            <a:schemeClr val="accent1">
+              <a:shade val="50000"/>
+            </a:schemeClr>
+          </a:lnRef>
+          <a:fillRef idx="1">
+            <a:schemeClr val="accent1"/>
+          </a:fillRef>
+          <a:effectRef idx="0">
+            <a:schemeClr val="accent1"/>
+          </a:effectRef>
+          <a:fontRef idx="minor">
+            <a:schemeClr val="lt1"/>
+          </a:fontRef>
+        </p:style>
+        <p:txBody>
+          <a:bodyPr rtlCol="0" anchor="ctr"/>
+          <a:lstStyle/>
+          <a:p>
+            <a:pPr algn="ctr"/>
+            <a:endParaRPr lang="en-US"/>
+          </a:p>
+        </p:txBody>
+      </p:sp>
+      <p:sp>
+        <p:nvSpPr>
+          <p:cNvPr id="40" name="Oval 39">
+            <a:extLst>
+              <a:ext uri="{FF2B5EF4-FFF2-40B4-BE49-F238E27FC236}">
+                <a16:creationId xmlns:a16="http://schemas.microsoft.com/office/drawing/2014/main" id="{5573C583-525C-4141-9F31-DD95A2E19090}"/>
+              </a:ext>
+            </a:extLst>
+          </p:cNvPr>
+          <p:cNvSpPr/>
+          <p:nvPr/>
+        </p:nvSpPr>
+        <p:spPr>
+          <a:xfrm>
+            <a:off x="7013948" y="575552"/>
+            <a:ext cx="91440" cy="95003"/>
+          </a:xfrm>
+          <a:prstGeom prst="ellipse">
+            <a:avLst/>
+          </a:prstGeom>
+          <a:solidFill>
+            <a:srgbClr val="207A78"/>
+          </a:solidFill>
+          <a:ln>
+            <a:noFill/>
+          </a:ln>
+        </p:spPr>
+        <p:style>
+          <a:lnRef idx="2">
+            <a:schemeClr val="accent1">
+              <a:shade val="50000"/>
+            </a:schemeClr>
+          </a:lnRef>
+          <a:fillRef idx="1">
+            <a:schemeClr val="accent1"/>
+          </a:fillRef>
+          <a:effectRef idx="0">
+            <a:schemeClr val="accent1"/>
+          </a:effectRef>
+          <a:fontRef idx="minor">
+            <a:schemeClr val="lt1"/>
+          </a:fontRef>
+        </p:style>
+        <p:txBody>
+          <a:bodyPr rtlCol="0" anchor="ctr"/>
+          <a:lstStyle/>
+          <a:p>
+            <a:pPr algn="ctr"/>
+            <a:endParaRPr lang="en-US"/>
+          </a:p>
+        </p:txBody>
+      </p:sp>
+      <p:sp>
+        <p:nvSpPr>
+          <p:cNvPr id="41" name="Oval 40">
+            <a:extLst>
+              <a:ext uri="{FF2B5EF4-FFF2-40B4-BE49-F238E27FC236}">
+                <a16:creationId xmlns:a16="http://schemas.microsoft.com/office/drawing/2014/main" id="{525F34E8-C2FB-C246-9484-9684D342FD20}"/>
+              </a:ext>
+            </a:extLst>
+          </p:cNvPr>
+          <p:cNvSpPr/>
+          <p:nvPr/>
+        </p:nvSpPr>
+        <p:spPr>
+          <a:xfrm>
+            <a:off x="5939167" y="730775"/>
+            <a:ext cx="91440" cy="95003"/>
+          </a:xfrm>
+          <a:prstGeom prst="ellipse">
+            <a:avLst/>
+          </a:prstGeom>
+          <a:solidFill>
+            <a:srgbClr val="98E196"/>
+          </a:solidFill>
+          <a:ln>
+            <a:noFill/>
+          </a:ln>
+        </p:spPr>
+        <p:style>
+          <a:lnRef idx="2">
+            <a:schemeClr val="accent1">
+              <a:shade val="50000"/>
+            </a:schemeClr>
+          </a:lnRef>
+          <a:fillRef idx="1">
+            <a:schemeClr val="accent1"/>
+          </a:fillRef>
+          <a:effectRef idx="0">
+            <a:schemeClr val="accent1"/>
+          </a:effectRef>
+          <a:fontRef idx="minor">
+            <a:schemeClr val="lt1"/>
+          </a:fontRef>
+        </p:style>
+        <p:txBody>
+          <a:bodyPr rtlCol="0" anchor="ctr"/>
+          <a:lstStyle/>
+          <a:p>
+            <a:pPr algn="ctr"/>
+            <a:endParaRPr lang="en-US"/>
+          </a:p>
+        </p:txBody>
+      </p:sp>
+      <p:sp>
+        <p:nvSpPr>
+          <p:cNvPr id="42" name="Oval 41">
+            <a:extLst>
+              <a:ext uri="{FF2B5EF4-FFF2-40B4-BE49-F238E27FC236}">
+                <a16:creationId xmlns:a16="http://schemas.microsoft.com/office/drawing/2014/main" id="{926E6B59-57FF-E245-BBA8-213EF760BA3E}"/>
+              </a:ext>
+            </a:extLst>
+          </p:cNvPr>
+          <p:cNvSpPr/>
+          <p:nvPr/>
+        </p:nvSpPr>
+        <p:spPr>
+          <a:xfrm>
+            <a:off x="6476558" y="730775"/>
+            <a:ext cx="91440" cy="95003"/>
+          </a:xfrm>
+          <a:prstGeom prst="ellipse">
+            <a:avLst/>
+          </a:prstGeom>
+          <a:solidFill>
+            <a:srgbClr val="4A9B82"/>
+          </a:solidFill>
+          <a:ln>
+            <a:noFill/>
+          </a:ln>
+        </p:spPr>
+        <p:style>
+          <a:lnRef idx="2">
+            <a:schemeClr val="accent1">
+              <a:shade val="50000"/>
+            </a:schemeClr>
+          </a:lnRef>
+          <a:fillRef idx="1">
+            <a:schemeClr val="accent1"/>
+          </a:fillRef>
+          <a:effectRef idx="0">
+            <a:schemeClr val="accent1"/>
+          </a:effectRef>
+          <a:fontRef idx="minor">
+            <a:schemeClr val="lt1"/>
+          </a:fontRef>
+        </p:style>
+        <p:txBody>
+          <a:bodyPr rtlCol="0" anchor="ctr"/>
+          <a:lstStyle/>
+          <a:p>
+            <a:pPr algn="ctr"/>
+            <a:endParaRPr lang="en-US"/>
+          </a:p>
+        </p:txBody>
+      </p:sp>
+      <p:sp>
+        <p:nvSpPr>
+          <p:cNvPr id="43" name="Oval 42">
+            <a:extLst>
+              <a:ext uri="{FF2B5EF4-FFF2-40B4-BE49-F238E27FC236}">
+                <a16:creationId xmlns:a16="http://schemas.microsoft.com/office/drawing/2014/main" id="{C3804961-A7AE-BF48-8C65-02C088CA1800}"/>
+              </a:ext>
+            </a:extLst>
+          </p:cNvPr>
+          <p:cNvSpPr/>
+          <p:nvPr/>
+        </p:nvSpPr>
+        <p:spPr>
+          <a:xfrm>
+            <a:off x="7013948" y="730775"/>
+            <a:ext cx="91440" cy="95003"/>
+          </a:xfrm>
+          <a:prstGeom prst="ellipse">
+            <a:avLst/>
+          </a:prstGeom>
+          <a:solidFill>
+            <a:srgbClr val="06404F"/>
+          </a:solidFill>
+          <a:ln>
+            <a:noFill/>
+          </a:ln>
+        </p:spPr>
+        <p:style>
+          <a:lnRef idx="2">
+            <a:schemeClr val="accent1">
+              <a:shade val="50000"/>
+            </a:schemeClr>
+          </a:lnRef>
+          <a:fillRef idx="1">
+            <a:schemeClr val="accent1"/>
+          </a:fillRef>
+          <a:effectRef idx="0">
+            <a:schemeClr val="accent1"/>
+          </a:effectRef>
+          <a:fontRef idx="minor">
+            <a:schemeClr val="lt1"/>
+          </a:fontRef>
+        </p:style>
+        <p:txBody>
+          <a:bodyPr rtlCol="0" anchor="ctr"/>
+          <a:lstStyle/>
+          <a:p>
+            <a:pPr algn="ctr"/>
+            <a:endParaRPr lang="en-US"/>
           </a:p>
         </p:txBody>
       </p:sp>

</xml_diff>